<commit_message>
update files with latest version
</commit_message>
<xml_diff>
--- a/EDI_Publishing/Macrosystems_EDDIE_Module_5_IntroForecasting/Editable_versions_all_files/Getting_Started_with_Shiny_FINAL.pptx
+++ b/EDI_Publishing/Macrosystems_EDDIE_Module_5_IntroForecasting/Editable_versions_all_files/Getting_Started_with_Shiny_FINAL.pptx
@@ -17,7 +17,7 @@
     <p:sldId id="262" r:id="rId8"/>
     <p:sldId id="263" r:id="rId9"/>
     <p:sldId id="264" r:id="rId10"/>
-    <p:sldId id="358" r:id="rId11"/>
+    <p:sldId id="372" r:id="rId11"/>
     <p:sldId id="364" r:id="rId12"/>
   </p:sldIdLst>
   <p:sldSz cx="9144000" cy="6858000" type="screen4x3"/>
@@ -242,7 +242,7 @@
           <a:p>
             <a:fld id="{A82DDFCD-3F30-1944-ABA1-69872AECA504}" type="datetimeFigureOut">
               <a:rPr lang="en-US" smtClean="0"/>
-              <a:t>7/14/2021</a:t>
+              <a:t>5/23/2022</a:t>
             </a:fld>
             <a:endParaRPr lang="en-US"/>
           </a:p>
@@ -1093,7 +1093,7 @@
           <a:p>
             <a:fld id="{1DF94D92-C448-4579-B07F-32E6DEFE663F}" type="datetime1">
               <a:rPr lang="en-US" smtClean="0"/>
-              <a:t>7/14/2021</a:t>
+              <a:t>5/23/2022</a:t>
             </a:fld>
             <a:endParaRPr lang="en-US"/>
           </a:p>
@@ -1296,7 +1296,7 @@
           <a:p>
             <a:fld id="{B9B9F908-2237-4E06-9F65-308A0C7C8360}" type="datetime1">
               <a:rPr lang="en-US" smtClean="0"/>
-              <a:t>7/14/2021</a:t>
+              <a:t>5/23/2022</a:t>
             </a:fld>
             <a:endParaRPr lang="en-US"/>
           </a:p>
@@ -1476,7 +1476,7 @@
           <a:p>
             <a:fld id="{0959C69C-A580-4E24-B56C-3104E0D70A78}" type="datetime1">
               <a:rPr lang="en-US" smtClean="0"/>
-              <a:t>7/14/2021</a:t>
+              <a:t>5/23/2022</a:t>
             </a:fld>
             <a:endParaRPr lang="en-US"/>
           </a:p>
@@ -1712,7 +1712,7 @@
           <a:p>
             <a:fld id="{D8D700E8-F4C3-418D-8F0B-98F92EA7D957}" type="datetime1">
               <a:rPr lang="en-US" smtClean="0"/>
-              <a:t>7/14/2021</a:t>
+              <a:t>5/23/2022</a:t>
             </a:fld>
             <a:endParaRPr lang="en-US"/>
           </a:p>
@@ -1960,7 +1960,7 @@
           <a:p>
             <a:fld id="{C7B253FB-B5EE-4F6E-AEF1-5A70BE8EC8F4}" type="datetime1">
               <a:rPr lang="en-US" smtClean="0"/>
-              <a:t>7/14/2021</a:t>
+              <a:t>5/23/2022</a:t>
             </a:fld>
             <a:endParaRPr lang="en-US"/>
           </a:p>
@@ -2282,7 +2282,7 @@
           <a:p>
             <a:fld id="{C6E16F7D-6513-4591-A873-8EA03FD8E2FA}" type="datetime1">
               <a:rPr lang="en-US" smtClean="0"/>
-              <a:t>7/14/2021</a:t>
+              <a:t>5/23/2022</a:t>
             </a:fld>
             <a:endParaRPr lang="en-US"/>
           </a:p>
@@ -2753,7 +2753,7 @@
           <a:p>
             <a:fld id="{484FF8CE-54E3-4482-9C96-B30823D6975F}" type="datetime1">
               <a:rPr lang="en-US" smtClean="0"/>
-              <a:t>7/14/2021</a:t>
+              <a:t>5/23/2022</a:t>
             </a:fld>
             <a:endParaRPr lang="en-US"/>
           </a:p>
@@ -2905,7 +2905,7 @@
           <a:p>
             <a:fld id="{70AB9494-44A4-4B56-9C86-DEEA67A930FA}" type="datetime1">
               <a:rPr lang="en-US" smtClean="0"/>
-              <a:t>7/14/2021</a:t>
+              <a:t>5/23/2022</a:t>
             </a:fld>
             <a:endParaRPr lang="en-US"/>
           </a:p>
@@ -3000,7 +3000,7 @@
           <a:p>
             <a:fld id="{2A3DDFCE-9A45-4088-A795-328B2A4D0393}" type="datetime1">
               <a:rPr lang="en-US" smtClean="0"/>
-              <a:t>7/14/2021</a:t>
+              <a:t>5/23/2022</a:t>
             </a:fld>
             <a:endParaRPr lang="en-US"/>
           </a:p>
@@ -3279,7 +3279,7 @@
           <a:p>
             <a:fld id="{7DFF054A-2AA5-4FCC-B50D-79DF96EEDB5C}" type="datetime1">
               <a:rPr lang="en-US" smtClean="0"/>
-              <a:t>7/14/2021</a:t>
+              <a:t>5/23/2022</a:t>
             </a:fld>
             <a:endParaRPr lang="en-US"/>
           </a:p>
@@ -3589,7 +3589,7 @@
           <a:p>
             <a:fld id="{21215959-AF93-4A72-9756-D43DBD37659F}" type="datetime1">
               <a:rPr lang="en-US" smtClean="0"/>
-              <a:t>7/14/2021</a:t>
+              <a:t>5/23/2022</a:t>
             </a:fld>
             <a:endParaRPr lang="en-US"/>
           </a:p>
@@ -3892,7 +3892,7 @@
           <a:p>
             <a:fld id="{1810413B-1DC0-4E02-8B37-9A210213BAC0}" type="datetime1">
               <a:rPr lang="en-US" smtClean="0"/>
-              <a:t>7/14/2021</a:t>
+              <a:t>5/23/2022</a:t>
             </a:fld>
             <a:endParaRPr lang="en-US"/>
           </a:p>
@@ -4656,12 +4656,142 @@
           </a:p>
         </p:txBody>
       </p:sp>
+      <p:sp>
+        <p:nvSpPr>
+          <p:cNvPr id="3" name="Content Placeholder 2">
+            <a:extLst>
+              <a:ext uri="{FF2B5EF4-FFF2-40B4-BE49-F238E27FC236}">
+                <a16:creationId xmlns:a16="http://schemas.microsoft.com/office/drawing/2014/main" id="{54067A24-7A80-4CC1-BC70-50CF20ECCAF4}"/>
+              </a:ext>
+            </a:extLst>
+          </p:cNvPr>
+          <p:cNvSpPr>
+            <a:spLocks noGrp="1"/>
+          </p:cNvSpPr>
+          <p:nvPr>
+            <p:ph idx="1"/>
+          </p:nvPr>
+        </p:nvSpPr>
+        <p:spPr>
+          <a:xfrm>
+            <a:off x="207010" y="1600200"/>
+            <a:ext cx="4300221" cy="4876800"/>
+          </a:xfrm>
+        </p:spPr>
+        <p:txBody>
+          <a:bodyPr>
+            <a:normAutofit fontScale="92500" lnSpcReduction="20000"/>
+          </a:bodyPr>
+          <a:lstStyle/>
+          <a:p>
+            <a:pPr marL="0" indent="0">
+              <a:buNone/>
+            </a:pPr>
+            <a:r>
+              <a:rPr lang="en-IE" dirty="0"/>
+              <a:t>Saving Progress</a:t>
+            </a:r>
+          </a:p>
+          <a:p>
+            <a:pPr marL="457200" indent="-457200">
+              <a:buFont typeface="+mj-lt"/>
+              <a:buAutoNum type="arabicPeriod"/>
+            </a:pPr>
+            <a:r>
+              <a:rPr lang="en-IE" dirty="0"/>
+              <a:t>Scroll to bottom of the page</a:t>
+            </a:r>
+          </a:p>
+          <a:p>
+            <a:pPr marL="457200" indent="-457200">
+              <a:buFont typeface="+mj-lt"/>
+              <a:buAutoNum type="arabicPeriod"/>
+            </a:pPr>
+            <a:r>
+              <a:rPr lang="en-IE" dirty="0"/>
+              <a:t>Click on the “Save Progress” button. An ‘.</a:t>
+            </a:r>
+            <a:r>
+              <a:rPr lang="en-IE" dirty="0" err="1"/>
+              <a:t>eddie</a:t>
+            </a:r>
+            <a:r>
+              <a:rPr lang="en-IE" dirty="0"/>
+              <a:t>’ file will download. Your computer might prompt you to open this in R. This will not work, it only works for uploading to the Shiny app</a:t>
+            </a:r>
+          </a:p>
+          <a:p>
+            <a:pPr marL="457200" indent="-457200">
+              <a:buFont typeface="+mj-lt"/>
+              <a:buAutoNum type="arabicPeriod"/>
+            </a:pPr>
+            <a:r>
+              <a:rPr lang="en-IE" dirty="0"/>
+              <a:t>Store this file somewhere safe on your computer</a:t>
+            </a:r>
+          </a:p>
+          <a:p>
+            <a:pPr marL="0" indent="0">
+              <a:buNone/>
+            </a:pPr>
+            <a:r>
+              <a:rPr lang="en-IE" dirty="0"/>
+              <a:t>Resuming progress</a:t>
+            </a:r>
+          </a:p>
+          <a:p>
+            <a:pPr marL="457200" indent="-457200">
+              <a:buFont typeface="+mj-lt"/>
+              <a:buAutoNum type="arabicPeriod"/>
+            </a:pPr>
+            <a:r>
+              <a:rPr lang="en-IE" dirty="0"/>
+              <a:t>Scroll to the top of the page</a:t>
+            </a:r>
+          </a:p>
+          <a:p>
+            <a:pPr marL="457200" indent="-457200">
+              <a:buFont typeface="+mj-lt"/>
+              <a:buAutoNum type="arabicPeriod"/>
+            </a:pPr>
+            <a:r>
+              <a:rPr lang="en-IE" dirty="0"/>
+              <a:t>Upload the ‘.</a:t>
+            </a:r>
+            <a:r>
+              <a:rPr lang="en-IE" dirty="0" err="1"/>
+              <a:t>eddie</a:t>
+            </a:r>
+            <a:r>
+              <a:rPr lang="en-IE" dirty="0"/>
+              <a:t>’ file</a:t>
+            </a:r>
+          </a:p>
+          <a:p>
+            <a:pPr marL="457200" indent="-457200">
+              <a:buFont typeface="+mj-lt"/>
+              <a:buAutoNum type="arabicPeriod"/>
+            </a:pPr>
+            <a:r>
+              <a:rPr lang="en-IE" dirty="0"/>
+              <a:t>This will populate your  saved text answers and saved parameters</a:t>
+            </a:r>
+          </a:p>
+          <a:p>
+            <a:pPr marL="457200" indent="-457200">
+              <a:buFont typeface="+mj-lt"/>
+              <a:buAutoNum type="arabicPeriod"/>
+            </a:pPr>
+            <a:endParaRPr lang="en-IE" dirty="0"/>
+          </a:p>
+        </p:txBody>
+      </p:sp>
       <p:pic>
         <p:nvPicPr>
-          <p:cNvPr id="4" name="Picture 3">
+          <p:cNvPr id="12" name="Picture 11">
             <a:extLst>
               <a:ext uri="{FF2B5EF4-FFF2-40B4-BE49-F238E27FC236}">
-                <a16:creationId xmlns:a16="http://schemas.microsoft.com/office/drawing/2014/main" id="{5D32B81C-039F-4CD5-8AD3-5364689ADD39}"/>
+                <a16:creationId xmlns:a16="http://schemas.microsoft.com/office/drawing/2014/main" id="{BAF5A4CA-438C-4465-86F0-B6A320340358}"/>
               </a:ext>
             </a:extLst>
           </p:cNvPr>
@@ -4678,113 +4808,54 @@
         </p:blipFill>
         <p:spPr>
           <a:xfrm>
-            <a:off x="4636770" y="2078355"/>
-            <a:ext cx="4476750" cy="3676650"/>
+            <a:off x="4938936" y="1612481"/>
+            <a:ext cx="3810000" cy="1355845"/>
           </a:xfrm>
           <a:prstGeom prst="rect">
             <a:avLst/>
           </a:prstGeom>
-          <a:ln w="12700">
+          <a:ln w="19050">
+            <a:solidFill>
+              <a:schemeClr val="accent1"/>
+            </a:solidFill>
+          </a:ln>
+        </p:spPr>
+      </p:pic>
+      <p:pic>
+        <p:nvPicPr>
+          <p:cNvPr id="14" name="Picture 13">
+            <a:extLst>
+              <a:ext uri="{FF2B5EF4-FFF2-40B4-BE49-F238E27FC236}">
+                <a16:creationId xmlns:a16="http://schemas.microsoft.com/office/drawing/2014/main" id="{3168DD53-EF58-44BE-95CD-F8119E8A657E}"/>
+              </a:ext>
+            </a:extLst>
+          </p:cNvPr>
+          <p:cNvPicPr>
+            <a:picLocks noChangeAspect="1"/>
+          </p:cNvPicPr>
+          <p:nvPr/>
+        </p:nvPicPr>
+        <p:blipFill>
+          <a:blip r:embed="rId3"/>
+          <a:stretch>
+            <a:fillRect/>
+          </a:stretch>
+        </p:blipFill>
+        <p:spPr>
+          <a:xfrm>
+            <a:off x="5048018" y="4414954"/>
+            <a:ext cx="3476625" cy="1971675"/>
+          </a:xfrm>
+          <a:prstGeom prst="rect">
+            <a:avLst/>
+          </a:prstGeom>
+          <a:ln w="19050">
             <a:solidFill>
               <a:schemeClr val="tx1"/>
             </a:solidFill>
           </a:ln>
         </p:spPr>
       </p:pic>
-      <p:sp>
-        <p:nvSpPr>
-          <p:cNvPr id="3" name="Content Placeholder 2">
-            <a:extLst>
-              <a:ext uri="{FF2B5EF4-FFF2-40B4-BE49-F238E27FC236}">
-                <a16:creationId xmlns:a16="http://schemas.microsoft.com/office/drawing/2014/main" id="{54067A24-7A80-4CC1-BC70-50CF20ECCAF4}"/>
-              </a:ext>
-            </a:extLst>
-          </p:cNvPr>
-          <p:cNvSpPr>
-            <a:spLocks noGrp="1"/>
-          </p:cNvSpPr>
-          <p:nvPr>
-            <p:ph idx="1"/>
-          </p:nvPr>
-        </p:nvSpPr>
-        <p:spPr>
-          <a:xfrm>
-            <a:off x="207010" y="1600200"/>
-            <a:ext cx="4364991" cy="4876800"/>
-          </a:xfrm>
-        </p:spPr>
-        <p:txBody>
-          <a:bodyPr>
-            <a:normAutofit fontScale="92500" lnSpcReduction="20000"/>
-          </a:bodyPr>
-          <a:lstStyle/>
-          <a:p>
-            <a:pPr marL="457200" indent="-457200">
-              <a:buFont typeface="+mj-lt"/>
-              <a:buAutoNum type="arabicPeriod"/>
-            </a:pPr>
-            <a:r>
-              <a:rPr lang="en-IE" dirty="0"/>
-              <a:t>Navigate to the “Introduction” tab</a:t>
-            </a:r>
-          </a:p>
-          <a:p>
-            <a:pPr marL="457200" indent="-457200">
-              <a:buFont typeface="+mj-lt"/>
-              <a:buAutoNum type="arabicPeriod"/>
-            </a:pPr>
-            <a:r>
-              <a:rPr lang="en-IE" dirty="0"/>
-              <a:t>Scroll down to “Save your progress” section</a:t>
-            </a:r>
-          </a:p>
-          <a:p>
-            <a:pPr marL="457200" indent="-457200">
-              <a:buFont typeface="+mj-lt"/>
-              <a:buAutoNum type="arabicPeriod"/>
-            </a:pPr>
-            <a:r>
-              <a:rPr lang="en-IE" dirty="0"/>
-              <a:t>Click on the “Download user input” button. A ‘.</a:t>
-            </a:r>
-            <a:r>
-              <a:rPr lang="en-IE" dirty="0" err="1"/>
-              <a:t>eddie</a:t>
-            </a:r>
-            <a:r>
-              <a:rPr lang="en-IE" dirty="0"/>
-              <a:t>’ file will download. Your computer might prompt you to open this in R. This will not work, it only works for uploading to the Shiny app</a:t>
-            </a:r>
-          </a:p>
-          <a:p>
-            <a:pPr marL="457200" indent="-457200">
-              <a:buFont typeface="+mj-lt"/>
-              <a:buAutoNum type="arabicPeriod"/>
-            </a:pPr>
-            <a:r>
-              <a:rPr lang="en-IE" dirty="0"/>
-              <a:t>Store this file somewhere safe on your computer</a:t>
-            </a:r>
-          </a:p>
-          <a:p>
-            <a:pPr marL="457200" indent="-457200">
-              <a:buFont typeface="+mj-lt"/>
-              <a:buAutoNum type="arabicPeriod"/>
-            </a:pPr>
-            <a:r>
-              <a:rPr lang="en-IE" dirty="0"/>
-              <a:t>When continuing, you will upload this file and it will populate your answers and saved parameters</a:t>
-            </a:r>
-          </a:p>
-          <a:p>
-            <a:pPr marL="457200" indent="-457200">
-              <a:buFont typeface="+mj-lt"/>
-              <a:buAutoNum type="arabicPeriod"/>
-            </a:pPr>
-            <a:endParaRPr lang="en-IE" dirty="0"/>
-          </a:p>
-        </p:txBody>
-      </p:sp>
       <p:sp>
         <p:nvSpPr>
           <p:cNvPr id="5" name="Rectangle 4">
@@ -4799,8 +4870,8 @@
         </p:nvSpPr>
         <p:spPr>
           <a:xfrm>
-            <a:off x="4676725" y="3360294"/>
-            <a:ext cx="1858781" cy="449705"/>
+            <a:off x="5708667" y="1976660"/>
+            <a:ext cx="1659182" cy="669312"/>
           </a:xfrm>
           <a:prstGeom prst="rect">
             <a:avLst/>
@@ -4837,6 +4908,50 @@
           </a:p>
         </p:txBody>
       </p:sp>
+      <p:cxnSp>
+        <p:nvCxnSpPr>
+          <p:cNvPr id="8" name="Straight Arrow Connector 7">
+            <a:extLst>
+              <a:ext uri="{FF2B5EF4-FFF2-40B4-BE49-F238E27FC236}">
+                <a16:creationId xmlns:a16="http://schemas.microsoft.com/office/drawing/2014/main" id="{57DB6BC3-ED4F-4FF2-9595-74EC4E55DF21}"/>
+              </a:ext>
+            </a:extLst>
+          </p:cNvPr>
+          <p:cNvCxnSpPr>
+            <a:cxnSpLocks/>
+          </p:cNvCxnSpPr>
+          <p:nvPr/>
+        </p:nvCxnSpPr>
+        <p:spPr>
+          <a:xfrm flipV="1">
+            <a:off x="4123652" y="2311316"/>
+            <a:ext cx="1536919" cy="409415"/>
+          </a:xfrm>
+          <a:prstGeom prst="straightConnector1">
+            <a:avLst/>
+          </a:prstGeom>
+          <a:ln w="38100">
+            <a:solidFill>
+              <a:srgbClr val="FF0000"/>
+            </a:solidFill>
+            <a:tailEnd type="triangle"/>
+          </a:ln>
+        </p:spPr>
+        <p:style>
+          <a:lnRef idx="1">
+            <a:schemeClr val="accent1"/>
+          </a:lnRef>
+          <a:fillRef idx="0">
+            <a:schemeClr val="accent1"/>
+          </a:fillRef>
+          <a:effectRef idx="0">
+            <a:schemeClr val="accent1"/>
+          </a:effectRef>
+          <a:fontRef idx="minor">
+            <a:schemeClr val="tx1"/>
+          </a:fontRef>
+        </p:style>
+      </p:cxnSp>
       <p:sp>
         <p:nvSpPr>
           <p:cNvPr id="6" name="Rectangle 5">
@@ -4851,8 +4966,8 @@
         </p:nvSpPr>
         <p:spPr>
           <a:xfrm>
-            <a:off x="4683760" y="4757960"/>
-            <a:ext cx="2987040" cy="639581"/>
+            <a:off x="5062532" y="5393261"/>
+            <a:ext cx="1963783" cy="601139"/>
           </a:xfrm>
           <a:prstGeom prst="rect">
             <a:avLst/>
@@ -4891,50 +5006,6 @@
       </p:sp>
       <p:cxnSp>
         <p:nvCxnSpPr>
-          <p:cNvPr id="8" name="Straight Arrow Connector 7">
-            <a:extLst>
-              <a:ext uri="{FF2B5EF4-FFF2-40B4-BE49-F238E27FC236}">
-                <a16:creationId xmlns:a16="http://schemas.microsoft.com/office/drawing/2014/main" id="{57DB6BC3-ED4F-4FF2-9595-74EC4E55DF21}"/>
-              </a:ext>
-            </a:extLst>
-          </p:cNvPr>
-          <p:cNvCxnSpPr>
-            <a:cxnSpLocks/>
-          </p:cNvCxnSpPr>
-          <p:nvPr/>
-        </p:nvCxnSpPr>
-        <p:spPr>
-          <a:xfrm>
-            <a:off x="4307801" y="3141689"/>
-            <a:ext cx="264199" cy="218605"/>
-          </a:xfrm>
-          <a:prstGeom prst="straightConnector1">
-            <a:avLst/>
-          </a:prstGeom>
-          <a:ln w="38100">
-            <a:solidFill>
-              <a:srgbClr val="FF0000"/>
-            </a:solidFill>
-            <a:tailEnd type="triangle"/>
-          </a:ln>
-        </p:spPr>
-        <p:style>
-          <a:lnRef idx="1">
-            <a:schemeClr val="accent1"/>
-          </a:lnRef>
-          <a:fillRef idx="0">
-            <a:schemeClr val="accent1"/>
-          </a:fillRef>
-          <a:effectRef idx="0">
-            <a:schemeClr val="accent1"/>
-          </a:effectRef>
-          <a:fontRef idx="minor">
-            <a:schemeClr val="tx1"/>
-          </a:fontRef>
-        </p:style>
-      </p:cxnSp>
-      <p:cxnSp>
-        <p:nvCxnSpPr>
           <p:cNvPr id="9" name="Straight Arrow Connector 8">
             <a:extLst>
               <a:ext uri="{FF2B5EF4-FFF2-40B4-BE49-F238E27FC236}">
@@ -4949,9 +5020,9 @@
           <p:nvPr/>
         </p:nvCxnSpPr>
         <p:spPr>
-          <a:xfrm flipV="1">
-            <a:off x="3759200" y="5077751"/>
-            <a:ext cx="924560" cy="547714"/>
+          <a:xfrm>
+            <a:off x="3525613" y="5393261"/>
+            <a:ext cx="1536919" cy="300570"/>
           </a:xfrm>
           <a:prstGeom prst="straightConnector1">
             <a:avLst/>
@@ -4981,7 +5052,7 @@
     </p:spTree>
     <p:extLst>
       <p:ext uri="{BB962C8B-B14F-4D97-AF65-F5344CB8AC3E}">
-        <p14:creationId xmlns:p14="http://schemas.microsoft.com/office/powerpoint/2010/main" val="3060563647"/>
+        <p14:creationId xmlns:p14="http://schemas.microsoft.com/office/powerpoint/2010/main" val="172792021"/>
       </p:ext>
     </p:extLst>
   </p:cSld>

</xml_diff>